<commit_message>
new code kho 04032025
</commit_message>
<xml_diff>
--- a/public/images/Kho/QTQLNVL_B8_QDGBNL.pptx
+++ b/public/images/Kho/QTQLNVL_B8_QDGBNL.pptx
@@ -270,7 +270,7 @@
           <a:p>
             <a:fld id="{29AD611B-C055-42B2-890A-58924ADED52E}" type="datetimeFigureOut">
               <a:rPr lang="en-US" smtClean="0"/>
-              <a:t>05-12-2024</a:t>
+              <a:t>04-03-2025</a:t>
             </a:fld>
             <a:endParaRPr lang="en-US"/>
           </a:p>
@@ -468,7 +468,7 @@
           <a:p>
             <a:fld id="{29AD611B-C055-42B2-890A-58924ADED52E}" type="datetimeFigureOut">
               <a:rPr lang="en-US" smtClean="0"/>
-              <a:t>05-12-2024</a:t>
+              <a:t>04-03-2025</a:t>
             </a:fld>
             <a:endParaRPr lang="en-US"/>
           </a:p>
@@ -676,7 +676,7 @@
           <a:p>
             <a:fld id="{29AD611B-C055-42B2-890A-58924ADED52E}" type="datetimeFigureOut">
               <a:rPr lang="en-US" smtClean="0"/>
-              <a:t>05-12-2024</a:t>
+              <a:t>04-03-2025</a:t>
             </a:fld>
             <a:endParaRPr lang="en-US"/>
           </a:p>
@@ -874,7 +874,7 @@
           <a:p>
             <a:fld id="{29AD611B-C055-42B2-890A-58924ADED52E}" type="datetimeFigureOut">
               <a:rPr lang="en-US" smtClean="0"/>
-              <a:t>05-12-2024</a:t>
+              <a:t>04-03-2025</a:t>
             </a:fld>
             <a:endParaRPr lang="en-US"/>
           </a:p>
@@ -1149,7 +1149,7 @@
           <a:p>
             <a:fld id="{29AD611B-C055-42B2-890A-58924ADED52E}" type="datetimeFigureOut">
               <a:rPr lang="en-US" smtClean="0"/>
-              <a:t>05-12-2024</a:t>
+              <a:t>04-03-2025</a:t>
             </a:fld>
             <a:endParaRPr lang="en-US"/>
           </a:p>
@@ -1414,7 +1414,7 @@
           <a:p>
             <a:fld id="{29AD611B-C055-42B2-890A-58924ADED52E}" type="datetimeFigureOut">
               <a:rPr lang="en-US" smtClean="0"/>
-              <a:t>05-12-2024</a:t>
+              <a:t>04-03-2025</a:t>
             </a:fld>
             <a:endParaRPr lang="en-US"/>
           </a:p>
@@ -1826,7 +1826,7 @@
           <a:p>
             <a:fld id="{29AD611B-C055-42B2-890A-58924ADED52E}" type="datetimeFigureOut">
               <a:rPr lang="en-US" smtClean="0"/>
-              <a:t>05-12-2024</a:t>
+              <a:t>04-03-2025</a:t>
             </a:fld>
             <a:endParaRPr lang="en-US"/>
           </a:p>
@@ -1967,7 +1967,7 @@
           <a:p>
             <a:fld id="{29AD611B-C055-42B2-890A-58924ADED52E}" type="datetimeFigureOut">
               <a:rPr lang="en-US" smtClean="0"/>
-              <a:t>05-12-2024</a:t>
+              <a:t>04-03-2025</a:t>
             </a:fld>
             <a:endParaRPr lang="en-US"/>
           </a:p>
@@ -2080,7 +2080,7 @@
           <a:p>
             <a:fld id="{29AD611B-C055-42B2-890A-58924ADED52E}" type="datetimeFigureOut">
               <a:rPr lang="en-US" smtClean="0"/>
-              <a:t>05-12-2024</a:t>
+              <a:t>04-03-2025</a:t>
             </a:fld>
             <a:endParaRPr lang="en-US"/>
           </a:p>
@@ -2391,7 +2391,7 @@
           <a:p>
             <a:fld id="{29AD611B-C055-42B2-890A-58924ADED52E}" type="datetimeFigureOut">
               <a:rPr lang="en-US" smtClean="0"/>
-              <a:t>05-12-2024</a:t>
+              <a:t>04-03-2025</a:t>
             </a:fld>
             <a:endParaRPr lang="en-US"/>
           </a:p>
@@ -2679,7 +2679,7 @@
           <a:p>
             <a:fld id="{29AD611B-C055-42B2-890A-58924ADED52E}" type="datetimeFigureOut">
               <a:rPr lang="en-US" smtClean="0"/>
-              <a:t>05-12-2024</a:t>
+              <a:t>04-03-2025</a:t>
             </a:fld>
             <a:endParaRPr lang="en-US"/>
           </a:p>
@@ -2920,7 +2920,7 @@
           <a:p>
             <a:fld id="{29AD611B-C055-42B2-890A-58924ADED52E}" type="datetimeFigureOut">
               <a:rPr lang="en-US" smtClean="0"/>
-              <a:t>05-12-2024</a:t>
+              <a:t>04-03-2025</a:t>
             </a:fld>
             <a:endParaRPr lang="en-US"/>
           </a:p>
@@ -3564,6 +3564,68 @@
                 <a:cs typeface="Arial" panose="020B0604020202020204" pitchFamily="34" charset="0"/>
               </a:rPr>
               <a:t>*TH4: KHÔNG TỒN (NGUYÊN LIỆU KHÔNG PHÍ  -  CÓ PHÍ - DƯ BÁO CÁO &lt;OVERSHIP&gt;)</a:t>
+            </a:r>
+            <a:endParaRPr lang="en-US" sz="1600" b="1" dirty="0">
+              <a:latin typeface="Arial" panose="020B0604020202020204" pitchFamily="34" charset="0"/>
+              <a:cs typeface="Arial" panose="020B0604020202020204" pitchFamily="34" charset="0"/>
+            </a:endParaRPr>
+          </a:p>
+        </p:txBody>
+      </p:sp>
+      <p:sp>
+        <p:nvSpPr>
+          <p:cNvPr id="2" name="TextBox 1">
+            <a:extLst>
+              <a:ext uri="{FF2B5EF4-FFF2-40B4-BE49-F238E27FC236}">
+                <a16:creationId xmlns:a16="http://schemas.microsoft.com/office/drawing/2014/main" id="{CF5393F6-BBB3-202D-E675-41B61E179A95}"/>
+              </a:ext>
+            </a:extLst>
+          </p:cNvPr>
+          <p:cNvSpPr txBox="1"/>
+          <p:nvPr/>
+        </p:nvSpPr>
+        <p:spPr>
+          <a:xfrm>
+            <a:off x="476247" y="3557072"/>
+            <a:ext cx="10763249" cy="338554"/>
+          </a:xfrm>
+          <a:prstGeom prst="rect">
+            <a:avLst/>
+          </a:prstGeom>
+          <a:noFill/>
+        </p:spPr>
+        <p:txBody>
+          <a:bodyPr wrap="square" rtlCol="0">
+            <a:spAutoFit/>
+          </a:bodyPr>
+          <a:lstStyle/>
+          <a:p>
+            <a:r>
+              <a:rPr lang="vi-VN" sz="1600" b="1" dirty="0">
+                <a:effectLst/>
+                <a:latin typeface="Arial" panose="020B0604020202020204" pitchFamily="34" charset="0"/>
+                <a:ea typeface="Times New Roman" panose="02020603050405020304" pitchFamily="18" charset="0"/>
+                <a:cs typeface="Arial" panose="020B0604020202020204" pitchFamily="34" charset="0"/>
+              </a:rPr>
+              <a:t>*TH</a:t>
+            </a:r>
+            <a:r>
+              <a:rPr lang="en-US" sz="1600" b="1" dirty="0">
+                <a:effectLst/>
+                <a:latin typeface="Arial" panose="020B0604020202020204" pitchFamily="34" charset="0"/>
+                <a:ea typeface="Times New Roman" panose="02020603050405020304" pitchFamily="18" charset="0"/>
+                <a:cs typeface="Arial" panose="020B0604020202020204" pitchFamily="34" charset="0"/>
+              </a:rPr>
+              <a:t>5</a:t>
+            </a:r>
+            <a:r>
+              <a:rPr lang="vi-VN" sz="1600" b="1" dirty="0">
+                <a:effectLst/>
+                <a:latin typeface="Arial" panose="020B0604020202020204" pitchFamily="34" charset="0"/>
+                <a:ea typeface="Times New Roman" panose="02020603050405020304" pitchFamily="18" charset="0"/>
+                <a:cs typeface="Arial" panose="020B0604020202020204" pitchFamily="34" charset="0"/>
+              </a:rPr>
+              <a:t>: SỬ DỤNG NGUYÊN LIỆU ORDER SAU CHO ORDER TRƯỚC) </a:t>
             </a:r>
             <a:endParaRPr lang="en-US" sz="1600" b="1" dirty="0">
               <a:latin typeface="Arial" panose="020B0604020202020204" pitchFamily="34" charset="0"/>

</xml_diff>